<commit_message>
Update rstudio.cloud project slides
</commit_message>
<xml_diff>
--- a/slides/99 - RStudio.cloud Setup.pptx
+++ b/slides/99 - RStudio.cloud Setup.pptx
@@ -3364,15 +3364,16 @@
                 <a:solidFill>
                   <a:srgbClr val="0070C0"/>
                 </a:solidFill>
-                <a:hlinkClick r:id="rId2">
-                  <a:extLst>
-                    <a:ext uri="{A12FA001-AC4F-418D-AE19-62706E023703}">
-                      <ahyp:hlinkClr xmlns:ahyp="http://schemas.microsoft.com/office/drawing/2018/hyperlinkcolor" val="tx"/>
-                    </a:ext>
-                  </a:extLst>
-                </a:hlinkClick>
               </a:rPr>
-              <a:t>https://rstudio.cloud/project/</a:t>
+              <a:t>https://</a:t>
+            </a:r>
+            <a:r>
+              <a:rPr lang="en-US" sz="5400" u="sng" dirty="0" err="1">
+                <a:solidFill>
+                  <a:srgbClr val="0070C0"/>
+                </a:solidFill>
+              </a:rPr>
+              <a:t>rstudio.cloud</a:t>
             </a:r>
             <a:r>
               <a:rPr lang="en-US" sz="5400" u="sng" dirty="0">
@@ -3380,7 +3381,7 @@
                   <a:srgbClr val="0070C0"/>
                 </a:solidFill>
               </a:rPr>
-              <a:t>1793948</a:t>
+              <a:t>/project/2008521</a:t>
             </a:r>
           </a:p>
         </p:txBody>

</xml_diff>